<commit_message>
Ajout background ppx de présentation
</commit_message>
<xml_diff>
--- a/maquettes/Wireframe.pptx
+++ b/maquettes/Wireframe.pptx
@@ -212,7 +212,7 @@
           <a:p>
             <a:fld id="{DF49FE40-4DBE-4F01-B0D4-F23081CB8554}" type="datetimeFigureOut">
               <a:rPr lang="fr-FR" smtClean="0"/>
-              <a:t>17/09/2025</a:t>
+              <a:t>23/09/2025</a:t>
             </a:fld>
             <a:endParaRPr lang="fr-FR"/>
           </a:p>
@@ -610,7 +610,7 @@
           <a:p>
             <a:fld id="{DAA95BF7-1DCC-4245-B41E-1ED774A32EFB}" type="datetimeFigureOut">
               <a:rPr lang="fr-FR" smtClean="0"/>
-              <a:t>17/09/2025</a:t>
+              <a:t>23/09/2025</a:t>
             </a:fld>
             <a:endParaRPr lang="fr-FR"/>
           </a:p>
@@ -780,7 +780,7 @@
           <a:p>
             <a:fld id="{DAA95BF7-1DCC-4245-B41E-1ED774A32EFB}" type="datetimeFigureOut">
               <a:rPr lang="fr-FR" smtClean="0"/>
-              <a:t>17/09/2025</a:t>
+              <a:t>23/09/2025</a:t>
             </a:fld>
             <a:endParaRPr lang="fr-FR"/>
           </a:p>
@@ -960,7 +960,7 @@
           <a:p>
             <a:fld id="{DAA95BF7-1DCC-4245-B41E-1ED774A32EFB}" type="datetimeFigureOut">
               <a:rPr lang="fr-FR" smtClean="0"/>
-              <a:t>17/09/2025</a:t>
+              <a:t>23/09/2025</a:t>
             </a:fld>
             <a:endParaRPr lang="fr-FR"/>
           </a:p>
@@ -1130,7 +1130,7 @@
           <a:p>
             <a:fld id="{DAA95BF7-1DCC-4245-B41E-1ED774A32EFB}" type="datetimeFigureOut">
               <a:rPr lang="fr-FR" smtClean="0"/>
-              <a:t>17/09/2025</a:t>
+              <a:t>23/09/2025</a:t>
             </a:fld>
             <a:endParaRPr lang="fr-FR"/>
           </a:p>
@@ -1374,7 +1374,7 @@
           <a:p>
             <a:fld id="{DAA95BF7-1DCC-4245-B41E-1ED774A32EFB}" type="datetimeFigureOut">
               <a:rPr lang="fr-FR" smtClean="0"/>
-              <a:t>17/09/2025</a:t>
+              <a:t>23/09/2025</a:t>
             </a:fld>
             <a:endParaRPr lang="fr-FR"/>
           </a:p>
@@ -1606,7 +1606,7 @@
           <a:p>
             <a:fld id="{DAA95BF7-1DCC-4245-B41E-1ED774A32EFB}" type="datetimeFigureOut">
               <a:rPr lang="fr-FR" smtClean="0"/>
-              <a:t>17/09/2025</a:t>
+              <a:t>23/09/2025</a:t>
             </a:fld>
             <a:endParaRPr lang="fr-FR"/>
           </a:p>
@@ -1973,7 +1973,7 @@
           <a:p>
             <a:fld id="{DAA95BF7-1DCC-4245-B41E-1ED774A32EFB}" type="datetimeFigureOut">
               <a:rPr lang="fr-FR" smtClean="0"/>
-              <a:t>17/09/2025</a:t>
+              <a:t>23/09/2025</a:t>
             </a:fld>
             <a:endParaRPr lang="fr-FR"/>
           </a:p>
@@ -2091,7 +2091,7 @@
           <a:p>
             <a:fld id="{DAA95BF7-1DCC-4245-B41E-1ED774A32EFB}" type="datetimeFigureOut">
               <a:rPr lang="fr-FR" smtClean="0"/>
-              <a:t>17/09/2025</a:t>
+              <a:t>23/09/2025</a:t>
             </a:fld>
             <a:endParaRPr lang="fr-FR"/>
           </a:p>
@@ -2186,7 +2186,7 @@
           <a:p>
             <a:fld id="{DAA95BF7-1DCC-4245-B41E-1ED774A32EFB}" type="datetimeFigureOut">
               <a:rPr lang="fr-FR" smtClean="0"/>
-              <a:t>17/09/2025</a:t>
+              <a:t>23/09/2025</a:t>
             </a:fld>
             <a:endParaRPr lang="fr-FR"/>
           </a:p>
@@ -2463,7 +2463,7 @@
           <a:p>
             <a:fld id="{DAA95BF7-1DCC-4245-B41E-1ED774A32EFB}" type="datetimeFigureOut">
               <a:rPr lang="fr-FR" smtClean="0"/>
-              <a:t>17/09/2025</a:t>
+              <a:t>23/09/2025</a:t>
             </a:fld>
             <a:endParaRPr lang="fr-FR"/>
           </a:p>
@@ -2720,7 +2720,7 @@
           <a:p>
             <a:fld id="{DAA95BF7-1DCC-4245-B41E-1ED774A32EFB}" type="datetimeFigureOut">
               <a:rPr lang="fr-FR" smtClean="0"/>
-              <a:t>17/09/2025</a:t>
+              <a:t>23/09/2025</a:t>
             </a:fld>
             <a:endParaRPr lang="fr-FR"/>
           </a:p>
@@ -2933,7 +2933,7 @@
           <a:p>
             <a:fld id="{DAA95BF7-1DCC-4245-B41E-1ED774A32EFB}" type="datetimeFigureOut">
               <a:rPr lang="fr-FR" smtClean="0"/>
-              <a:t>17/09/2025</a:t>
+              <a:t>23/09/2025</a:t>
             </a:fld>
             <a:endParaRPr lang="fr-FR"/>
           </a:p>

</xml_diff>